<commit_message>
Updated Final Presentation Slides
</commit_message>
<xml_diff>
--- a/Final_Presentation/Team_4_Final_Presentation.pptx
+++ b/Final_Presentation/Team_4_Final_Presentation.pptx
@@ -120,6 +120,14 @@
     </p:ext>
   </p:extLst>
 </p:presentation>
+</file>
+
+<file path=ppt/revisionInfo.xml><?xml version="1.0" encoding="utf-8"?>
+<p1510:revInfo xmlns:a="http://schemas.openxmlformats.org/drawingml/2006/main" xmlns:r="http://schemas.openxmlformats.org/officeDocument/2006/relationships" xmlns:p1510="http://schemas.microsoft.com/office/powerpoint/2015/10/main">
+  <p1510:revLst>
+    <p1510:client id="{2D5A3601-F72A-4573-B026-953B8B5E9547}" v="110" dt="2025-05-07T19:55:34.458"/>
+  </p1510:revLst>
+</p1510:revInfo>
 </file>
 
 <file path=ppt/diagrams/colors1.xml><?xml version="1.0" encoding="utf-8"?>
@@ -6211,7 +6219,7 @@
           <a:p>
             <a:fld id="{DD997E93-1C09-47B7-89B0-78454C233E1A}" type="datetimeFigureOut">
               <a:rPr lang="en-US" smtClean="0"/>
-              <a:t>5/5/2025</a:t>
+              <a:t>5/7/2025</a:t>
             </a:fld>
             <a:endParaRPr lang="en-US"/>
           </a:p>
@@ -6758,7 +6766,7 @@
           <a:p>
             <a:fld id="{42F1BB42-BFC8-474A-9D69-65C817AE1623}" type="datetimeFigureOut">
               <a:rPr lang="en-US" smtClean="0"/>
-              <a:t>5/5/2025</a:t>
+              <a:t>5/7/2025</a:t>
             </a:fld>
             <a:endParaRPr lang="en-US"/>
           </a:p>
@@ -6979,7 +6987,7 @@
           <a:p>
             <a:fld id="{42F1BB42-BFC8-474A-9D69-65C817AE1623}" type="datetimeFigureOut">
               <a:rPr lang="en-US" smtClean="0"/>
-              <a:t>5/5/2025</a:t>
+              <a:t>5/7/2025</a:t>
             </a:fld>
             <a:endParaRPr lang="en-US"/>
           </a:p>
@@ -7159,7 +7167,7 @@
           <a:p>
             <a:fld id="{42F1BB42-BFC8-474A-9D69-65C817AE1623}" type="datetimeFigureOut">
               <a:rPr lang="en-US" smtClean="0"/>
-              <a:t>5/5/2025</a:t>
+              <a:t>5/7/2025</a:t>
             </a:fld>
             <a:endParaRPr lang="en-US"/>
           </a:p>
@@ -7329,7 +7337,7 @@
           <a:p>
             <a:fld id="{42F1BB42-BFC8-474A-9D69-65C817AE1623}" type="datetimeFigureOut">
               <a:rPr lang="en-US" smtClean="0"/>
-              <a:t>5/5/2025</a:t>
+              <a:t>5/7/2025</a:t>
             </a:fld>
             <a:endParaRPr lang="en-US"/>
           </a:p>
@@ -7580,7 +7588,7 @@
           <a:p>
             <a:fld id="{42F1BB42-BFC8-474A-9D69-65C817AE1623}" type="datetimeFigureOut">
               <a:rPr lang="en-US" smtClean="0"/>
-              <a:t>5/5/2025</a:t>
+              <a:t>5/7/2025</a:t>
             </a:fld>
             <a:endParaRPr lang="en-US"/>
           </a:p>
@@ -7903,7 +7911,7 @@
           <a:p>
             <a:fld id="{42F1BB42-BFC8-474A-9D69-65C817AE1623}" type="datetimeFigureOut">
               <a:rPr lang="en-US" smtClean="0"/>
-              <a:t>5/5/2025</a:t>
+              <a:t>5/7/2025</a:t>
             </a:fld>
             <a:endParaRPr lang="en-US"/>
           </a:p>
@@ -8327,7 +8335,7 @@
           <a:p>
             <a:fld id="{42F1BB42-BFC8-474A-9D69-65C817AE1623}" type="datetimeFigureOut">
               <a:rPr lang="en-US" smtClean="0"/>
-              <a:t>5/5/2025</a:t>
+              <a:t>5/7/2025</a:t>
             </a:fld>
             <a:endParaRPr lang="en-US"/>
           </a:p>
@@ -8445,7 +8453,7 @@
           <a:p>
             <a:fld id="{42F1BB42-BFC8-474A-9D69-65C817AE1623}" type="datetimeFigureOut">
               <a:rPr lang="en-US" smtClean="0"/>
-              <a:t>5/5/2025</a:t>
+              <a:t>5/7/2025</a:t>
             </a:fld>
             <a:endParaRPr lang="en-US"/>
           </a:p>
@@ -8540,7 +8548,7 @@
           <a:p>
             <a:fld id="{42F1BB42-BFC8-474A-9D69-65C817AE1623}" type="datetimeFigureOut">
               <a:rPr lang="en-US" smtClean="0"/>
-              <a:t>5/5/2025</a:t>
+              <a:t>5/7/2025</a:t>
             </a:fld>
             <a:endParaRPr lang="en-US"/>
           </a:p>
@@ -8830,7 +8838,7 @@
           <a:p>
             <a:fld id="{42F1BB42-BFC8-474A-9D69-65C817AE1623}" type="datetimeFigureOut">
               <a:rPr lang="en-US" smtClean="0"/>
-              <a:t>5/5/2025</a:t>
+              <a:t>5/7/2025</a:t>
             </a:fld>
             <a:endParaRPr lang="en-US"/>
           </a:p>
@@ -9102,7 +9110,7 @@
           <a:p>
             <a:fld id="{42F1BB42-BFC8-474A-9D69-65C817AE1623}" type="datetimeFigureOut">
               <a:rPr lang="en-US" smtClean="0"/>
-              <a:t>5/5/2025</a:t>
+              <a:t>5/7/2025</a:t>
             </a:fld>
             <a:endParaRPr lang="en-US"/>
           </a:p>
@@ -9356,7 +9364,7 @@
           <a:p>
             <a:fld id="{42F1BB42-BFC8-474A-9D69-65C817AE1623}" type="datetimeFigureOut">
               <a:rPr lang="en-US" smtClean="0"/>
-              <a:t>5/5/2025</a:t>
+              <a:t>5/7/2025</a:t>
             </a:fld>
             <a:endParaRPr lang="en-US"/>
           </a:p>
@@ -10625,7 +10633,7 @@
 </file>
 
 <file path=ppt/slides/slide4.xml><?xml version="1.0" encoding="utf-8"?>
-<p:sld xmlns:a="http://schemas.openxmlformats.org/drawingml/2006/main" xmlns:r="http://schemas.openxmlformats.org/officeDocument/2006/relationships" xmlns:p="http://schemas.openxmlformats.org/presentationml/2006/main">
+<p:sld xmlns:a="http://schemas.openxmlformats.org/drawingml/2006/main" xmlns:r="http://schemas.openxmlformats.org/officeDocument/2006/relationships" xmlns:p="http://schemas.openxmlformats.org/presentationml/2006/main" show="0">
   <p:cSld>
     <p:bg>
       <p:bgPr>
@@ -10729,7 +10737,7 @@
 </file>
 
 <file path=ppt/slides/slide5.xml><?xml version="1.0" encoding="utf-8"?>
-<p:sld xmlns:a="http://schemas.openxmlformats.org/drawingml/2006/main" xmlns:r="http://schemas.openxmlformats.org/officeDocument/2006/relationships" xmlns:p="http://schemas.openxmlformats.org/presentationml/2006/main">
+<p:sld xmlns:a="http://schemas.openxmlformats.org/drawingml/2006/main" xmlns:r="http://schemas.openxmlformats.org/officeDocument/2006/relationships" xmlns:p="http://schemas.openxmlformats.org/presentationml/2006/main" show="0">
   <p:cSld>
     <p:bg>
       <p:bgPr>
@@ -11185,7 +11193,7 @@
         </p:nvSpPr>
         <p:spPr>
           <a:xfrm>
-            <a:off x="7558564" y="609600"/>
+            <a:off x="4135425" y="703385"/>
             <a:ext cx="3912583" cy="1356360"/>
           </a:xfrm>
         </p:spPr>
@@ -11196,47 +11204,12 @@
           <a:lstStyle/>
           <a:p>
             <a:r>
-              <a:rPr lang="en-US" sz="3200"/>
+              <a:rPr lang="en-US" sz="3600" dirty="0"/>
               <a:t>Unique Features</a:t>
             </a:r>
           </a:p>
         </p:txBody>
       </p:sp>
-      <p:pic>
-        <p:nvPicPr>
-          <p:cNvPr id="4" name="Picture 3" descr="A screenshot of a computer&#10;&#10;Description automatically generated">
-            <a:extLst>
-              <a:ext uri="{FF2B5EF4-FFF2-40B4-BE49-F238E27FC236}">
-                <a16:creationId xmlns:a16="http://schemas.microsoft.com/office/drawing/2014/main" id="{D8987619-5F93-7064-F624-A62BFD053A33}"/>
-              </a:ext>
-            </a:extLst>
-          </p:cNvPr>
-          <p:cNvPicPr>
-            <a:picLocks noChangeAspect="1"/>
-          </p:cNvPicPr>
-          <p:nvPr/>
-        </p:nvPicPr>
-        <p:blipFill>
-          <a:blip r:embed="rId2">
-            <a:extLst>
-              <a:ext uri="{28A0092B-C50C-407E-A947-70E740481C1C}">
-                <a14:useLocalDpi xmlns:a14="http://schemas.microsoft.com/office/drawing/2010/main" val="0"/>
-              </a:ext>
-            </a:extLst>
-          </a:blip>
-          <a:srcRect l="14140" t="18475" r="36908"/>
-          <a:stretch/>
-        </p:blipFill>
-        <p:spPr>
-          <a:xfrm>
-            <a:off x="982840" y="857675"/>
-            <a:ext cx="5824024" cy="5140669"/>
-          </a:xfrm>
-          <a:prstGeom prst="rect">
-            <a:avLst/>
-          </a:prstGeom>
-        </p:spPr>
-      </p:pic>
       <p:sp>
         <p:nvSpPr>
           <p:cNvPr id="3" name="Content Placeholder 2">
@@ -11255,32 +11228,43 @@
         </p:nvSpPr>
         <p:spPr>
           <a:xfrm>
-            <a:off x="7558564" y="2057400"/>
-            <a:ext cx="3912583" cy="4038600"/>
+            <a:off x="864687" y="2069123"/>
+            <a:ext cx="10184429" cy="4038600"/>
           </a:xfrm>
         </p:spPr>
         <p:txBody>
-          <a:bodyPr>
+          <a:bodyPr vert="horz" lIns="91440" tIns="45720" rIns="91440" bIns="45720" rtlCol="0" anchor="t">
             <a:normAutofit/>
           </a:bodyPr>
           <a:lstStyle/>
           <a:p>
+            <a:pPr>
+              <a:lnSpc>
+                <a:spcPct val="250000"/>
+              </a:lnSpc>
+            </a:pPr>
             <a:r>
-              <a:rPr lang="en-US" sz="1600" dirty="0"/>
+              <a:rPr lang="en-US" sz="2400" dirty="0"/>
               <a:t>Powerful </a:t>
             </a:r>
             <a:r>
-              <a:rPr lang="en-US" sz="1600" dirty="0" err="1"/>
+              <a:rPr lang="en-US" sz="2400" err="1"/>
               <a:t>TinyMCE</a:t>
             </a:r>
             <a:r>
-              <a:rPr lang="en-US" sz="1600" dirty="0"/>
+              <a:rPr lang="en-US" sz="2400" dirty="0"/>
               <a:t> Editor utilized to create, edit, and view</a:t>
             </a:r>
-          </a:p>
-          <a:p>
+            <a:endParaRPr lang="en-US"/>
+          </a:p>
+          <a:p>
+            <a:pPr>
+              <a:lnSpc>
+                <a:spcPct val="250000"/>
+              </a:lnSpc>
+            </a:pPr>
             <a:r>
-              <a:rPr lang="en-US" sz="1600" dirty="0"/>
+              <a:rPr lang="en-US" sz="2400" dirty="0"/>
               <a:t>AI powered note categorization with Google AI</a:t>
             </a:r>
           </a:p>
@@ -11407,7 +11391,7 @@
         </p:nvSpPr>
         <p:spPr>
           <a:xfrm>
-            <a:off x="7558564" y="609600"/>
+            <a:off x="4135426" y="703385"/>
             <a:ext cx="3912583" cy="1356360"/>
           </a:xfrm>
         </p:spPr>
@@ -11424,43 +11408,6 @@
           </a:p>
         </p:txBody>
       </p:sp>
-      <p:pic>
-        <p:nvPicPr>
-          <p:cNvPr id="5" name="Content Placeholder 4" descr="A screenshot of a computer&#10;&#10;Description automatically generated">
-            <a:extLst>
-              <a:ext uri="{FF2B5EF4-FFF2-40B4-BE49-F238E27FC236}">
-                <a16:creationId xmlns:a16="http://schemas.microsoft.com/office/drawing/2014/main" id="{7AF9F743-ED2E-82CC-2CC8-FBD486A4AEC6}"/>
-              </a:ext>
-            </a:extLst>
-          </p:cNvPr>
-          <p:cNvPicPr>
-            <a:picLocks noGrp="1" noChangeAspect="1"/>
-          </p:cNvPicPr>
-          <p:nvPr>
-            <p:ph idx="1"/>
-          </p:nvPr>
-        </p:nvPicPr>
-        <p:blipFill>
-          <a:blip r:embed="rId2">
-            <a:extLst>
-              <a:ext uri="{28A0092B-C50C-407E-A947-70E740481C1C}">
-                <a14:useLocalDpi xmlns:a14="http://schemas.microsoft.com/office/drawing/2010/main" val="0"/>
-              </a:ext>
-            </a:extLst>
-          </a:blip>
-          <a:srcRect l="15092" t="9446" r="37898" b="3478"/>
-          <a:stretch/>
-        </p:blipFill>
-        <p:spPr>
-          <a:xfrm>
-            <a:off x="1264229" y="857675"/>
-            <a:ext cx="5261245" cy="5140669"/>
-          </a:xfrm>
-          <a:prstGeom prst="rect">
-            <a:avLst/>
-          </a:prstGeom>
-        </p:spPr>
-      </p:pic>
       <p:sp>
         <p:nvSpPr>
           <p:cNvPr id="4" name="Content Placeholder 2">
@@ -11477,15 +11424,15 @@
         </p:nvSpPr>
         <p:spPr>
           <a:xfrm>
-            <a:off x="7558564" y="2057400"/>
-            <a:ext cx="3912583" cy="4038600"/>
+            <a:off x="1087426" y="2069123"/>
+            <a:ext cx="10043752" cy="4038600"/>
           </a:xfrm>
           <a:prstGeom prst="rect">
             <a:avLst/>
           </a:prstGeom>
         </p:spPr>
         <p:txBody>
-          <a:bodyPr vert="horz" lIns="91440" tIns="45720" rIns="91440" bIns="45720" rtlCol="0">
+          <a:bodyPr vert="horz" lIns="91440" tIns="45720" rIns="91440" bIns="45720" rtlCol="0" anchor="t">
             <a:normAutofit/>
           </a:bodyPr>
           <a:lstStyle>
@@ -11713,10 +11660,41 @@
             </a:lvl9pPr>
           </a:lstStyle>
           <a:p>
+            <a:pPr>
+              <a:lnSpc>
+                <a:spcPct val="250000"/>
+              </a:lnSpc>
+            </a:pPr>
             <a:r>
-              <a:rPr lang="en-US" sz="1600"/>
+              <a:rPr lang="en-US" sz="2400" dirty="0"/>
               <a:t>Minimum password requirements for enhanced security</a:t>
             </a:r>
+            <a:endParaRPr lang="en-US" sz="2400"/>
+          </a:p>
+          <a:p>
+            <a:pPr>
+              <a:lnSpc>
+                <a:spcPct val="250000"/>
+              </a:lnSpc>
+            </a:pPr>
+            <a:r>
+              <a:rPr lang="en-US" sz="2400" dirty="0"/>
+              <a:t>Link to "About Page" to read over the purpose of this application</a:t>
+            </a:r>
+          </a:p>
+          <a:p>
+            <a:pPr>
+              <a:lnSpc>
+                <a:spcPct val="250000"/>
+              </a:lnSpc>
+            </a:pPr>
+            <a:r>
+              <a:rPr lang="en-US" sz="2400" dirty="0"/>
+              <a:t>Simple Sign-Up Process</a:t>
+            </a:r>
+          </a:p>
+          <a:p>
+            <a:endParaRPr lang="en-US" sz="1600" dirty="0"/>
           </a:p>
         </p:txBody>
       </p:sp>

</xml_diff>